<commit_message>
Präsi mit NTB logo
</commit_message>
<xml_diff>
--- a/Doku & Präsi/Präsentation Projekt Sudoku.pptx
+++ b/Doku & Präsi/Präsentation Projekt Sudoku.pptx
@@ -8,6 +8,9 @@
   <p:notesMasterIdLst>
     <p:notesMasterId r:id="rId15"/>
   </p:notesMasterIdLst>
+  <p:handoutMasterIdLst>
+    <p:handoutMasterId r:id="rId16"/>
+  </p:handoutMasterIdLst>
   <p:sldIdLst>
     <p:sldId id="256" r:id="rId3"/>
     <p:sldId id="265" r:id="rId4"/>
@@ -127,6 +130,172 @@
 </p:presentation>
 </file>
 
+<file path=ppt/handoutMasters/handoutMaster1.xml><?xml version="1.0" encoding="utf-8"?>
+<p:handoutMaster xmlns:a="http://schemas.openxmlformats.org/drawingml/2006/main" xmlns:r="http://schemas.openxmlformats.org/officeDocument/2006/relationships" xmlns:p="http://schemas.openxmlformats.org/presentationml/2006/main">
+  <p:cSld>
+    <p:bg>
+      <p:bgRef idx="1001">
+        <a:schemeClr val="bg1"/>
+      </p:bgRef>
+    </p:bg>
+    <p:spTree>
+      <p:nvGrpSpPr>
+        <p:cNvPr id="1" name=""/>
+        <p:cNvGrpSpPr/>
+        <p:nvPr/>
+      </p:nvGrpSpPr>
+      <p:grpSpPr>
+        <a:xfrm>
+          <a:off x="0" y="0"/>
+          <a:ext cx="0" cy="0"/>
+          <a:chOff x="0" y="0"/>
+          <a:chExt cx="0" cy="0"/>
+        </a:xfrm>
+      </p:grpSpPr>
+      <p:sp>
+        <p:nvSpPr>
+          <p:cNvPr id="2" name="Kopfzeilenplatzhalter 1"/>
+          <p:cNvSpPr>
+            <a:spLocks noGrp="1"/>
+          </p:cNvSpPr>
+          <p:nvPr>
+            <p:ph type="hdr" sz="quarter"/>
+          </p:nvPr>
+        </p:nvSpPr>
+        <p:spPr>
+          <a:xfrm>
+            <a:off x="0" y="0"/>
+            <a:ext cx="2971800" cy="458788"/>
+          </a:xfrm>
+          <a:prstGeom prst="rect">
+            <a:avLst/>
+          </a:prstGeom>
+        </p:spPr>
+        <p:txBody>
+          <a:bodyPr vert="horz" lIns="91440" tIns="45720" rIns="91440" bIns="45720" rtlCol="0"/>
+          <a:lstStyle>
+            <a:lvl1pPr algn="l">
+              <a:defRPr sz="1200"/>
+            </a:lvl1pPr>
+          </a:lstStyle>
+          <a:p>
+            <a:endParaRPr lang="de-CH"/>
+          </a:p>
+        </p:txBody>
+      </p:sp>
+      <p:sp>
+        <p:nvSpPr>
+          <p:cNvPr id="3" name="Datumsplatzhalter 2"/>
+          <p:cNvSpPr>
+            <a:spLocks noGrp="1"/>
+          </p:cNvSpPr>
+          <p:nvPr>
+            <p:ph type="dt" sz="quarter" idx="1"/>
+          </p:nvPr>
+        </p:nvSpPr>
+        <p:spPr>
+          <a:xfrm>
+            <a:off x="3884613" y="0"/>
+            <a:ext cx="2971800" cy="458788"/>
+          </a:xfrm>
+          <a:prstGeom prst="rect">
+            <a:avLst/>
+          </a:prstGeom>
+        </p:spPr>
+        <p:txBody>
+          <a:bodyPr vert="horz" lIns="91440" tIns="45720" rIns="91440" bIns="45720" rtlCol="0"/>
+          <a:lstStyle>
+            <a:lvl1pPr algn="r">
+              <a:defRPr sz="1200"/>
+            </a:lvl1pPr>
+          </a:lstStyle>
+          <a:p>
+            <a:fld id="{71AC92A1-C48A-4B49-8EF0-E12E4958CDE7}" type="datetimeFigureOut">
+              <a:rPr lang="de-CH" smtClean="0"/>
+              <a:t>02.05.2017</a:t>
+            </a:fld>
+            <a:endParaRPr lang="de-CH"/>
+          </a:p>
+        </p:txBody>
+      </p:sp>
+      <p:sp>
+        <p:nvSpPr>
+          <p:cNvPr id="4" name="Fußzeilenplatzhalter 3"/>
+          <p:cNvSpPr>
+            <a:spLocks noGrp="1"/>
+          </p:cNvSpPr>
+          <p:nvPr>
+            <p:ph type="ftr" sz="quarter" idx="2"/>
+          </p:nvPr>
+        </p:nvSpPr>
+        <p:spPr>
+          <a:xfrm>
+            <a:off x="0" y="8685213"/>
+            <a:ext cx="2971800" cy="458787"/>
+          </a:xfrm>
+          <a:prstGeom prst="rect">
+            <a:avLst/>
+          </a:prstGeom>
+        </p:spPr>
+        <p:txBody>
+          <a:bodyPr vert="horz" lIns="91440" tIns="45720" rIns="91440" bIns="45720" rtlCol="0" anchor="b"/>
+          <a:lstStyle>
+            <a:lvl1pPr algn="l">
+              <a:defRPr sz="1200"/>
+            </a:lvl1pPr>
+          </a:lstStyle>
+          <a:p>
+            <a:endParaRPr lang="de-CH"/>
+          </a:p>
+        </p:txBody>
+      </p:sp>
+      <p:sp>
+        <p:nvSpPr>
+          <p:cNvPr id="5" name="Foliennummernplatzhalter 4"/>
+          <p:cNvSpPr>
+            <a:spLocks noGrp="1"/>
+          </p:cNvSpPr>
+          <p:nvPr>
+            <p:ph type="sldNum" sz="quarter" idx="3"/>
+          </p:nvPr>
+        </p:nvSpPr>
+        <p:spPr>
+          <a:xfrm>
+            <a:off x="3884613" y="8685213"/>
+            <a:ext cx="2971800" cy="458787"/>
+          </a:xfrm>
+          <a:prstGeom prst="rect">
+            <a:avLst/>
+          </a:prstGeom>
+        </p:spPr>
+        <p:txBody>
+          <a:bodyPr vert="horz" lIns="91440" tIns="45720" rIns="91440" bIns="45720" rtlCol="0" anchor="b"/>
+          <a:lstStyle>
+            <a:lvl1pPr algn="r">
+              <a:defRPr sz="1200"/>
+            </a:lvl1pPr>
+          </a:lstStyle>
+          <a:p>
+            <a:fld id="{C794C9D1-F3E1-4D80-A0EE-C04182C81C90}" type="slidenum">
+              <a:rPr lang="de-CH" smtClean="0"/>
+              <a:t>‹Nr.›</a:t>
+            </a:fld>
+            <a:endParaRPr lang="de-CH"/>
+          </a:p>
+        </p:txBody>
+      </p:sp>
+    </p:spTree>
+    <p:extLst>
+      <p:ext uri="{BB962C8B-B14F-4D97-AF65-F5344CB8AC3E}">
+        <p14:creationId xmlns:p14="http://schemas.microsoft.com/office/powerpoint/2010/main" val="3884023939"/>
+      </p:ext>
+    </p:extLst>
+  </p:cSld>
+  <p:clrMap bg1="lt1" tx1="dk1" bg2="lt2" tx2="dk2" accent1="accent1" accent2="accent2" accent3="accent3" accent4="accent4" accent5="accent5" accent6="accent6" hlink="hlink" folHlink="folHlink"/>
+  <p:hf hdr="0" ftr="0" dt="0"/>
+</p:handoutMaster>
+</file>
+
 <file path=ppt/notesMasters/notesMaster1.xml><?xml version="1.0" encoding="utf-8"?>
 <p:notesMaster xmlns:a="http://schemas.openxmlformats.org/drawingml/2006/main" xmlns:r="http://schemas.openxmlformats.org/officeDocument/2006/relationships" xmlns:p="http://schemas.openxmlformats.org/presentationml/2006/main">
   <p:cSld>
@@ -209,7 +378,7 @@
           <a:p>
             <a:fld id="{039521F4-C9F4-4D95-ABAF-C5D6D7FC103D}" type="datetimeFigureOut">
               <a:rPr lang="de-CH" smtClean="0"/>
-              <a:t>13.04.2017</a:t>
+              <a:t>02.05.2017</a:t>
             </a:fld>
             <a:endParaRPr lang="de-CH"/>
           </a:p>
@@ -382,6 +551,7 @@
     </p:extLst>
   </p:cSld>
   <p:clrMap bg1="lt1" tx1="dk1" bg2="lt2" tx2="dk2" accent1="accent1" accent2="accent2" accent3="accent3" accent4="accent4" accent5="accent5" accent6="accent6" hlink="hlink" folHlink="folHlink"/>
+  <p:hf hdr="0" ftr="0" dt="0"/>
   <p:notesStyle>
     <a:lvl1pPr marL="0" algn="l" defTabSz="914400" rtl="0" eaLnBrk="1" latinLnBrk="0" hangingPunct="1">
       <a:defRPr sz="1200" kern="1200">
@@ -606,9 +776,9 @@
           <a:bodyPr/>
           <a:lstStyle/>
           <a:p>
-            <a:fld id="{8DAF5344-08ED-4390-859D-BC3AE766082B}" type="datetime1">
-              <a:rPr lang="de-CH" smtClean="0"/>
-              <a:t>13.04.2017</a:t>
+            <a:fld id="{21EB492E-4EF3-44E5-8F69-0AFC014FAB26}" type="datetime1">
+              <a:rPr lang="de-DE" smtClean="0"/>
+              <a:t>02.05.2017</a:t>
             </a:fld>
             <a:endParaRPr lang="de-CH"/>
           </a:p>
@@ -629,10 +799,6 @@
           <a:bodyPr/>
           <a:lstStyle/>
           <a:p>
-            <a:r>
-              <a:rPr lang="de-CH" smtClean="0"/>
-              <a:t>Team Injodikaran Projekt Hashi </a:t>
-            </a:r>
             <a:endParaRPr lang="de-CH"/>
           </a:p>
         </p:txBody>
@@ -780,9 +946,9 @@
           <a:bodyPr/>
           <a:lstStyle/>
           <a:p>
-            <a:fld id="{142501F8-2AA0-4EB7-A4DE-3B769DA50F1C}" type="datetime1">
-              <a:rPr lang="de-CH" smtClean="0"/>
-              <a:t>13.04.2017</a:t>
+            <a:fld id="{9C775645-F137-4583-9312-FA158EFEB54B}" type="datetime1">
+              <a:rPr lang="de-DE" smtClean="0"/>
+              <a:t>02.05.2017</a:t>
             </a:fld>
             <a:endParaRPr lang="de-CH"/>
           </a:p>
@@ -803,10 +969,6 @@
           <a:bodyPr/>
           <a:lstStyle/>
           <a:p>
-            <a:r>
-              <a:rPr lang="de-CH" smtClean="0"/>
-              <a:t>Team Injodikaran Projekt Hashi </a:t>
-            </a:r>
             <a:endParaRPr lang="de-CH"/>
           </a:p>
         </p:txBody>
@@ -964,9 +1126,9 @@
           <a:bodyPr/>
           <a:lstStyle/>
           <a:p>
-            <a:fld id="{9ED6391B-C6B6-4CE1-B0AD-7E6042A49B5D}" type="datetime1">
-              <a:rPr lang="de-CH" smtClean="0"/>
-              <a:t>13.04.2017</a:t>
+            <a:fld id="{7D68E1F2-D30F-47CA-9924-C0A23C9113F7}" type="datetime1">
+              <a:rPr lang="de-DE" smtClean="0"/>
+              <a:t>02.05.2017</a:t>
             </a:fld>
             <a:endParaRPr lang="de-CH"/>
           </a:p>
@@ -987,10 +1149,6 @@
           <a:bodyPr/>
           <a:lstStyle/>
           <a:p>
-            <a:r>
-              <a:rPr lang="de-CH" smtClean="0"/>
-              <a:t>Team Injodikaran Projekt Hashi </a:t>
-            </a:r>
             <a:endParaRPr lang="de-CH"/>
           </a:p>
         </p:txBody>
@@ -1198,9 +1356,9 @@
           <a:bodyPr/>
           <a:lstStyle/>
           <a:p>
-            <a:fld id="{6D09B216-EA7F-4D08-8700-60CA2D180B2B}" type="datetime1">
-              <a:rPr lang="de-CH" smtClean="0"/>
-              <a:t>13.04.2017</a:t>
+            <a:fld id="{6C5CFD41-6FFB-4AB0-80B0-DF67839F0A53}" type="datetime1">
+              <a:rPr lang="de-DE" smtClean="0"/>
+              <a:t>02.05.2017</a:t>
             </a:fld>
             <a:endParaRPr lang="de-CH"/>
           </a:p>
@@ -1221,10 +1379,6 @@
           <a:bodyPr/>
           <a:lstStyle/>
           <a:p>
-            <a:r>
-              <a:rPr lang="de-CH" smtClean="0"/>
-              <a:t>Team Injodikaran Projekt Hashi </a:t>
-            </a:r>
             <a:endParaRPr lang="de-CH"/>
           </a:p>
         </p:txBody>
@@ -1448,9 +1602,9 @@
           <a:bodyPr/>
           <a:lstStyle/>
           <a:p>
-            <a:fld id="{76D36973-6F86-4CF5-8B6A-F6EDE461137E}" type="datetime1">
-              <a:rPr lang="de-CH" smtClean="0"/>
-              <a:t>13.04.2017</a:t>
+            <a:fld id="{34B3FF2F-3B9A-4AD2-888E-D70E97281BF5}" type="datetime1">
+              <a:rPr lang="de-DE" smtClean="0"/>
+              <a:t>02.05.2017</a:t>
             </a:fld>
             <a:endParaRPr lang="de-CH"/>
           </a:p>
@@ -1471,10 +1625,6 @@
           <a:bodyPr/>
           <a:lstStyle/>
           <a:p>
-            <a:r>
-              <a:rPr lang="de-CH" smtClean="0"/>
-              <a:t>Team Injodikaran Projekt Hashi </a:t>
-            </a:r>
             <a:endParaRPr lang="de-CH"/>
           </a:p>
         </p:txBody>
@@ -1684,9 +1834,9 @@
           <a:bodyPr/>
           <a:lstStyle/>
           <a:p>
-            <a:fld id="{217BBFA2-F803-4372-9178-E5CA77416BB0}" type="datetime1">
-              <a:rPr lang="de-CH" smtClean="0"/>
-              <a:t>13.04.2017</a:t>
+            <a:fld id="{0425E168-3093-4DB7-85BC-C7855E36EEE8}" type="datetime1">
+              <a:rPr lang="de-DE" smtClean="0"/>
+              <a:t>02.05.2017</a:t>
             </a:fld>
             <a:endParaRPr lang="de-CH"/>
           </a:p>
@@ -1707,10 +1857,6 @@
           <a:bodyPr/>
           <a:lstStyle/>
           <a:p>
-            <a:r>
-              <a:rPr lang="de-CH" smtClean="0"/>
-              <a:t>Team Injodikaran Projekt Hashi </a:t>
-            </a:r>
             <a:endParaRPr lang="de-CH"/>
           </a:p>
         </p:txBody>
@@ -2055,9 +2201,9 @@
           <a:bodyPr/>
           <a:lstStyle/>
           <a:p>
-            <a:fld id="{9A39D969-FA3D-46F0-9E3E-A8C4A9468A44}" type="datetime1">
-              <a:rPr lang="de-CH" smtClean="0"/>
-              <a:t>13.04.2017</a:t>
+            <a:fld id="{D6B89706-AC29-4F14-99CD-5B0D69D188AB}" type="datetime1">
+              <a:rPr lang="de-DE" smtClean="0"/>
+              <a:t>02.05.2017</a:t>
             </a:fld>
             <a:endParaRPr lang="de-CH"/>
           </a:p>
@@ -2078,10 +2224,6 @@
           <a:bodyPr/>
           <a:lstStyle/>
           <a:p>
-            <a:r>
-              <a:rPr lang="de-CH" smtClean="0"/>
-              <a:t>Team Injodikaran Projekt Hashi </a:t>
-            </a:r>
             <a:endParaRPr lang="de-CH"/>
           </a:p>
         </p:txBody>
@@ -2177,9 +2319,9 @@
           <a:bodyPr/>
           <a:lstStyle/>
           <a:p>
-            <a:fld id="{5E60FDB0-6C36-4B74-9E74-FEECA4B0F6AC}" type="datetime1">
-              <a:rPr lang="de-CH" smtClean="0"/>
-              <a:t>13.04.2017</a:t>
+            <a:fld id="{384AD13C-408B-4A5B-8F1B-C81DFD04B989}" type="datetime1">
+              <a:rPr lang="de-DE" smtClean="0"/>
+              <a:t>02.05.2017</a:t>
             </a:fld>
             <a:endParaRPr lang="de-CH"/>
           </a:p>
@@ -2200,10 +2342,6 @@
           <a:bodyPr/>
           <a:lstStyle/>
           <a:p>
-            <a:r>
-              <a:rPr lang="de-CH" smtClean="0"/>
-              <a:t>Team Injodikaran Projekt Hashi </a:t>
-            </a:r>
             <a:endParaRPr lang="de-CH"/>
           </a:p>
         </p:txBody>
@@ -2276,9 +2414,9 @@
           <a:bodyPr/>
           <a:lstStyle/>
           <a:p>
-            <a:fld id="{5A7699A1-F9D1-4BB0-9EEA-879EE582B423}" type="datetime1">
-              <a:rPr lang="de-CH" smtClean="0"/>
-              <a:t>13.04.2017</a:t>
+            <a:fld id="{1225D077-1ECE-4CC9-A49B-EEDBB1E08800}" type="datetime1">
+              <a:rPr lang="de-DE" smtClean="0"/>
+              <a:t>02.05.2017</a:t>
             </a:fld>
             <a:endParaRPr lang="de-CH"/>
           </a:p>
@@ -2299,10 +2437,6 @@
           <a:bodyPr/>
           <a:lstStyle/>
           <a:p>
-            <a:r>
-              <a:rPr lang="de-CH" smtClean="0"/>
-              <a:t>Team Injodikaran Projekt Hashi </a:t>
-            </a:r>
             <a:endParaRPr lang="de-CH"/>
           </a:p>
         </p:txBody>
@@ -2557,9 +2691,9 @@
           <a:bodyPr/>
           <a:lstStyle/>
           <a:p>
-            <a:fld id="{22ADF3A5-EC16-4D19-A649-6BC849BC1622}" type="datetime1">
-              <a:rPr lang="de-CH" smtClean="0"/>
-              <a:t>13.04.2017</a:t>
+            <a:fld id="{C6F9109A-01CC-45A1-8361-970145EC17AB}" type="datetime1">
+              <a:rPr lang="de-DE" smtClean="0"/>
+              <a:t>02.05.2017</a:t>
             </a:fld>
             <a:endParaRPr lang="de-CH"/>
           </a:p>
@@ -2580,10 +2714,6 @@
           <a:bodyPr/>
           <a:lstStyle/>
           <a:p>
-            <a:r>
-              <a:rPr lang="de-CH" smtClean="0"/>
-              <a:t>Team Injodikaran Projekt Hashi </a:t>
-            </a:r>
             <a:endParaRPr lang="de-CH"/>
           </a:p>
         </p:txBody>
@@ -2814,9 +2944,9 @@
           <a:bodyPr/>
           <a:lstStyle/>
           <a:p>
-            <a:fld id="{0F9C052F-67E6-49DC-A60C-2D29735754A8}" type="datetime1">
-              <a:rPr lang="de-CH" smtClean="0"/>
-              <a:t>13.04.2017</a:t>
+            <a:fld id="{85391B11-FEEA-457E-BDFC-C60BD2E45102}" type="datetime1">
+              <a:rPr lang="de-DE" smtClean="0"/>
+              <a:t>02.05.2017</a:t>
             </a:fld>
             <a:endParaRPr lang="de-CH"/>
           </a:p>
@@ -2837,10 +2967,6 @@
           <a:bodyPr/>
           <a:lstStyle/>
           <a:p>
-            <a:r>
-              <a:rPr lang="de-CH" smtClean="0"/>
-              <a:t>Team Injodikaran Projekt Hashi </a:t>
-            </a:r>
             <a:endParaRPr lang="de-CH"/>
           </a:p>
         </p:txBody>
@@ -2993,38 +3119,38 @@
           <a:p>
             <a:pPr lvl="0"/>
             <a:r>
-              <a:rPr lang="de-DE" smtClean="0"/>
+              <a:rPr lang="de-DE" dirty="0" smtClean="0"/>
               <a:t>Formatvorlagen des Textmasters bearbeiten</a:t>
             </a:r>
           </a:p>
           <a:p>
             <a:pPr lvl="1"/>
             <a:r>
-              <a:rPr lang="de-DE" smtClean="0"/>
+              <a:rPr lang="de-DE" dirty="0" smtClean="0"/>
               <a:t>Zweite Ebene</a:t>
             </a:r>
           </a:p>
           <a:p>
             <a:pPr lvl="2"/>
             <a:r>
-              <a:rPr lang="de-DE" smtClean="0"/>
+              <a:rPr lang="de-DE" dirty="0" smtClean="0"/>
               <a:t>Dritte Ebene</a:t>
             </a:r>
           </a:p>
           <a:p>
             <a:pPr lvl="3"/>
             <a:r>
-              <a:rPr lang="de-DE" smtClean="0"/>
+              <a:rPr lang="de-DE" dirty="0" smtClean="0"/>
               <a:t>Vierte Ebene</a:t>
             </a:r>
           </a:p>
           <a:p>
             <a:pPr lvl="4"/>
             <a:r>
-              <a:rPr lang="de-DE" smtClean="0"/>
+              <a:rPr lang="de-DE" dirty="0" smtClean="0"/>
               <a:t>Fünfte Ebene</a:t>
             </a:r>
-            <a:endParaRPr lang="de-CH"/>
+            <a:endParaRPr lang="de-CH" dirty="0"/>
           </a:p>
         </p:txBody>
       </p:sp>
@@ -3061,9 +3187,9 @@
             </a:lvl1pPr>
           </a:lstStyle>
           <a:p>
-            <a:fld id="{0E798B7F-C6AF-4918-82AD-AB4C89642670}" type="datetime1">
-              <a:rPr lang="de-CH" smtClean="0"/>
-              <a:t>13.04.2017</a:t>
+            <a:fld id="{CB9599E6-A112-499D-8B49-6E209F4B22F6}" type="datetime1">
+              <a:rPr lang="de-DE" smtClean="0"/>
+              <a:t>02.05.2017</a:t>
             </a:fld>
             <a:endParaRPr lang="de-CH"/>
           </a:p>
@@ -3102,10 +3228,6 @@
             </a:lvl1pPr>
           </a:lstStyle>
           <a:p>
-            <a:r>
-              <a:rPr lang="de-CH" smtClean="0"/>
-              <a:t>Team Injodikaran Projekt Hashi </a:t>
-            </a:r>
             <a:endParaRPr lang="de-CH"/>
           </a:p>
         </p:txBody>
@@ -3143,14 +3265,44 @@
             </a:lvl1pPr>
           </a:lstStyle>
           <a:p>
-            <a:fld id="{2B4A2A88-09B5-4B83-9B03-70976F071804}" type="slidenum">
-              <a:rPr lang="de-CH" smtClean="0"/>
-              <a:t>‹Nr.›</a:t>
-            </a:fld>
-            <a:endParaRPr lang="de-CH"/>
-          </a:p>
-        </p:txBody>
-      </p:sp>
+            <a:r>
+              <a:rPr lang="de-CH" dirty="0" smtClean="0"/>
+              <a:t>S.1</a:t>
+            </a:r>
+            <a:endParaRPr lang="de-CH" dirty="0"/>
+          </a:p>
+        </p:txBody>
+      </p:sp>
+      <p:pic>
+        <p:nvPicPr>
+          <p:cNvPr id="8" name="Grafik 7"/>
+          <p:cNvPicPr>
+            <a:picLocks noChangeAspect="1"/>
+          </p:cNvPicPr>
+          <p:nvPr userDrawn="1"/>
+        </p:nvPicPr>
+        <p:blipFill>
+          <a:blip r:embed="rId13" cstate="print">
+            <a:extLst>
+              <a:ext uri="{28A0092B-C50C-407E-A947-70E740481C1C}">
+                <a14:useLocalDpi xmlns:a14="http://schemas.microsoft.com/office/drawing/2010/main" val="0"/>
+              </a:ext>
+            </a:extLst>
+          </a:blip>
+          <a:stretch>
+            <a:fillRect/>
+          </a:stretch>
+        </p:blipFill>
+        <p:spPr>
+          <a:xfrm>
+            <a:off x="9489440" y="0"/>
+            <a:ext cx="2702560" cy="1073703"/>
+          </a:xfrm>
+          <a:prstGeom prst="rect">
+            <a:avLst/>
+          </a:prstGeom>
+        </p:spPr>
+      </p:pic>
     </p:spTree>
     <p:extLst>
       <p:ext uri="{BB962C8B-B14F-4D97-AF65-F5344CB8AC3E}">
@@ -3172,7 +3324,7 @@
     <p:sldLayoutId id="2147483658" r:id="rId10"/>
     <p:sldLayoutId id="2147483659" r:id="rId11"/>
   </p:sldLayoutIdLst>
-  <p:hf hdr="0"/>
+  <p:hf hdr="0" ftr="0"/>
   <p:txStyles>
     <p:titleStyle>
       <a:lvl1pPr algn="l" defTabSz="914400" rtl="0" eaLnBrk="1" latinLnBrk="0" hangingPunct="1">
@@ -3520,7 +3672,7 @@
     <p:sldLayoutId id="2147483661" r:id="rId1"/>
     <p:sldLayoutId id="2147483662" r:id="rId2"/>
   </p:sldLayoutIdLst>
-  <p:hf hdr="0"/>
+  <p:hf hdr="0" ftr="0"/>
   <p:txStyles>
     <p:titleStyle>
       <a:lvl1pPr algn="l" defTabSz="914400" rtl="0" eaLnBrk="1" latinLnBrk="0" hangingPunct="1">
@@ -3860,11 +4012,7 @@
           <a:p>
             <a:r>
               <a:rPr lang="de-CH" dirty="0" smtClean="0"/>
-              <a:t>Arbeitsk</a:t>
-            </a:r>
-            <a:r>
-              <a:rPr lang="de-CH" dirty="0" smtClean="0"/>
-              <a:t>onzept </a:t>
+              <a:t>Arbeitskonzept </a:t>
             </a:r>
           </a:p>
           <a:p>
@@ -3872,7 +4020,6 @@
               <a:rPr lang="de-CH" dirty="0" smtClean="0"/>
               <a:t>Zeitplan</a:t>
             </a:r>
-            <a:endParaRPr lang="de-CH" dirty="0" smtClean="0"/>
           </a:p>
           <a:p>
             <a:r>
@@ -4044,7 +4191,7 @@
       </p:sp>
       <p:sp>
         <p:nvSpPr>
-          <p:cNvPr id="3" name="Datumsplatzhalter 2"/>
+          <p:cNvPr id="7" name="Datumsplatzhalter 6"/>
           <p:cNvSpPr>
             <a:spLocks noGrp="1"/>
           </p:cNvSpPr>
@@ -4057,48 +4204,17 @@
           <a:bodyPr/>
           <a:lstStyle/>
           <a:p>
-            <a:fld id="{624CB174-D2A0-4FA3-95CD-A2AC8C3B431D}" type="datetime1">
-              <a:rPr lang="de-CH" b="1" smtClean="0"/>
-              <a:t>13.04.2017</a:t>
+            <a:fld id="{0F0E3B49-CB29-4F58-978B-DF82537E37C9}" type="datetime1">
+              <a:rPr lang="de-DE" smtClean="0"/>
+              <a:t>02.05.2017</a:t>
             </a:fld>
-            <a:endParaRPr lang="de-CH" b="1" dirty="0"/>
-          </a:p>
-        </p:txBody>
-      </p:sp>
-      <p:sp>
-        <p:nvSpPr>
-          <p:cNvPr id="4" name="Fußzeilenplatzhalter 3"/>
-          <p:cNvSpPr>
-            <a:spLocks noGrp="1"/>
-          </p:cNvSpPr>
-          <p:nvPr>
-            <p:ph type="ftr" sz="quarter" idx="11"/>
-          </p:nvPr>
-        </p:nvSpPr>
-        <p:spPr/>
-        <p:txBody>
-          <a:bodyPr/>
-          <a:lstStyle/>
-          <a:p>
-            <a:r>
-              <a:rPr lang="de-CH" b="1" dirty="0" smtClean="0"/>
-              <a:t>Team Injodikaran Projekt </a:t>
-            </a:r>
-            <a:r>
-              <a:rPr lang="de-CH" b="1" dirty="0" err="1" smtClean="0"/>
-              <a:t>Hashi</a:t>
-            </a:r>
-            <a:r>
-              <a:rPr lang="de-CH" b="1" dirty="0" smtClean="0"/>
-              <a:t> </a:t>
-            </a:r>
-            <a:endParaRPr lang="de-CH" b="1" dirty="0"/>
-          </a:p>
-        </p:txBody>
-      </p:sp>
-      <p:sp>
-        <p:nvSpPr>
-          <p:cNvPr id="5" name="Foliennummernplatzhalter 4"/>
+            <a:endParaRPr lang="de-CH"/>
+          </a:p>
+        </p:txBody>
+      </p:sp>
+      <p:sp>
+        <p:nvSpPr>
+          <p:cNvPr id="9" name="Foliennummernplatzhalter 8"/>
           <p:cNvSpPr>
             <a:spLocks noGrp="1"/>
           </p:cNvSpPr>
@@ -4210,7 +4326,7 @@
       </p:sp>
       <p:sp>
         <p:nvSpPr>
-          <p:cNvPr id="3" name="Datumsplatzhalter 2"/>
+          <p:cNvPr id="7" name="Datumsplatzhalter 6"/>
           <p:cNvSpPr>
             <a:spLocks noGrp="1"/>
           </p:cNvSpPr>
@@ -4223,9 +4339,9 @@
           <a:bodyPr/>
           <a:lstStyle/>
           <a:p>
-            <a:fld id="{2426EF52-3D7E-415F-83FD-C0BDC38EC242}" type="datetime1">
-              <a:rPr lang="de-CH" smtClean="0"/>
-              <a:t>13.04.2017</a:t>
+            <a:fld id="{DA7E1F75-E013-4A83-9122-2E5644D3093D}" type="datetime1">
+              <a:rPr lang="de-DE" smtClean="0"/>
+              <a:t>02.05.2017</a:t>
             </a:fld>
             <a:endParaRPr lang="de-CH"/>
           </a:p>
@@ -4233,30 +4349,7 @@
       </p:sp>
       <p:sp>
         <p:nvSpPr>
-          <p:cNvPr id="4" name="Fußzeilenplatzhalter 3"/>
-          <p:cNvSpPr>
-            <a:spLocks noGrp="1"/>
-          </p:cNvSpPr>
-          <p:nvPr>
-            <p:ph type="ftr" sz="quarter" idx="11"/>
-          </p:nvPr>
-        </p:nvSpPr>
-        <p:spPr/>
-        <p:txBody>
-          <a:bodyPr/>
-          <a:lstStyle/>
-          <a:p>
-            <a:r>
-              <a:rPr lang="de-CH" smtClean="0"/>
-              <a:t>Team Injodikaran Projekt Hashi </a:t>
-            </a:r>
-            <a:endParaRPr lang="de-CH"/>
-          </a:p>
-        </p:txBody>
-      </p:sp>
-      <p:sp>
-        <p:nvSpPr>
-          <p:cNvPr id="5" name="Foliennummernplatzhalter 4"/>
+          <p:cNvPr id="9" name="Foliennummernplatzhalter 8"/>
           <p:cNvSpPr>
             <a:spLocks noGrp="1"/>
           </p:cNvSpPr>
@@ -4346,7 +4439,7 @@
       </p:sp>
       <p:sp>
         <p:nvSpPr>
-          <p:cNvPr id="3" name="Datumsplatzhalter 2"/>
+          <p:cNvPr id="6" name="Datumsplatzhalter 5"/>
           <p:cNvSpPr>
             <a:spLocks noGrp="1"/>
           </p:cNvSpPr>
@@ -4359,48 +4452,17 @@
           <a:bodyPr/>
           <a:lstStyle/>
           <a:p>
-            <a:fld id="{624CB174-D2A0-4FA3-95CD-A2AC8C3B431D}" type="datetime1">
-              <a:rPr lang="de-CH" b="1" smtClean="0"/>
-              <a:t>13.04.2017</a:t>
+            <a:fld id="{FB6405CA-45A2-4C1C-A5C6-9514832685B5}" type="datetime1">
+              <a:rPr lang="de-DE" smtClean="0"/>
+              <a:t>02.05.2017</a:t>
             </a:fld>
-            <a:endParaRPr lang="de-CH" b="1" dirty="0"/>
-          </a:p>
-        </p:txBody>
-      </p:sp>
-      <p:sp>
-        <p:nvSpPr>
-          <p:cNvPr id="4" name="Fußzeilenplatzhalter 3"/>
-          <p:cNvSpPr>
-            <a:spLocks noGrp="1"/>
-          </p:cNvSpPr>
-          <p:nvPr>
-            <p:ph type="ftr" sz="quarter" idx="11"/>
-          </p:nvPr>
-        </p:nvSpPr>
-        <p:spPr/>
-        <p:txBody>
-          <a:bodyPr/>
-          <a:lstStyle/>
-          <a:p>
-            <a:r>
-              <a:rPr lang="de-CH" b="1" dirty="0" smtClean="0"/>
-              <a:t>Team Injodikaran Projekt </a:t>
-            </a:r>
-            <a:r>
-              <a:rPr lang="de-CH" b="1" dirty="0" err="1" smtClean="0"/>
-              <a:t>Hashi</a:t>
-            </a:r>
-            <a:r>
-              <a:rPr lang="de-CH" b="1" dirty="0" smtClean="0"/>
-              <a:t> </a:t>
-            </a:r>
-            <a:endParaRPr lang="de-CH" b="1" dirty="0"/>
-          </a:p>
-        </p:txBody>
-      </p:sp>
-      <p:sp>
-        <p:nvSpPr>
-          <p:cNvPr id="5" name="Foliennummernplatzhalter 4"/>
+            <a:endParaRPr lang="de-CH"/>
+          </a:p>
+        </p:txBody>
+      </p:sp>
+      <p:sp>
+        <p:nvSpPr>
+          <p:cNvPr id="8" name="Foliennummernplatzhalter 7"/>
           <p:cNvSpPr>
             <a:spLocks noGrp="1"/>
           </p:cNvSpPr>
@@ -4535,7 +4597,7 @@
       </p:sp>
       <p:sp>
         <p:nvSpPr>
-          <p:cNvPr id="3" name="Datumsplatzhalter 2"/>
+          <p:cNvPr id="7" name="Datumsplatzhalter 6"/>
           <p:cNvSpPr>
             <a:spLocks noGrp="1"/>
           </p:cNvSpPr>
@@ -4548,151 +4610,17 @@
           <a:bodyPr/>
           <a:lstStyle/>
           <a:p>
-            <a:pPr marL="0" marR="0" lvl="0" indent="0" algn="l" defTabSz="914400" rtl="0" eaLnBrk="1" fontAlgn="auto" latinLnBrk="0" hangingPunct="1">
-              <a:lnSpc>
-                <a:spcPct val="100000"/>
-              </a:lnSpc>
-              <a:spcBef>
-                <a:spcPts val="0"/>
-              </a:spcBef>
-              <a:spcAft>
-                <a:spcPts val="0"/>
-              </a:spcAft>
-              <a:buClrTx/>
-              <a:buSzTx/>
-              <a:buFontTx/>
-              <a:buNone/>
-              <a:tabLst/>
-              <a:defRPr/>
-            </a:pPr>
-            <a:fld id="{2426EF52-3D7E-415F-83FD-C0BDC38EC242}" type="datetime1">
-              <a:rPr kumimoji="0" lang="de-CH" sz="1200" b="0" i="0" u="none" strike="noStrike" kern="1200" cap="none" spc="0" normalizeH="0" baseline="0" noProof="0" smtClean="0">
-                <a:ln>
-                  <a:noFill/>
-                </a:ln>
-                <a:solidFill>
-                  <a:prstClr val="black">
-                    <a:tint val="75000"/>
-                  </a:prstClr>
-                </a:solidFill>
-                <a:effectLst/>
-                <a:uLnTx/>
-                <a:uFillTx/>
-                <a:latin typeface="Calibri" panose="020F0502020204030204"/>
-                <a:ea typeface="+mn-ea"/>
-                <a:cs typeface="+mn-cs"/>
-              </a:rPr>
-              <a:pPr marL="0" marR="0" lvl="0" indent="0" algn="l" defTabSz="914400" rtl="0" eaLnBrk="1" fontAlgn="auto" latinLnBrk="0" hangingPunct="1">
-                <a:lnSpc>
-                  <a:spcPct val="100000"/>
-                </a:lnSpc>
-                <a:spcBef>
-                  <a:spcPts val="0"/>
-                </a:spcBef>
-                <a:spcAft>
-                  <a:spcPts val="0"/>
-                </a:spcAft>
-                <a:buClrTx/>
-                <a:buSzTx/>
-                <a:buFontTx/>
-                <a:buNone/>
-                <a:tabLst/>
-                <a:defRPr/>
-              </a:pPr>
-              <a:t>13.04.2017</a:t>
+            <a:fld id="{69AE92EA-D591-4878-BB80-E70DFF970D81}" type="datetime1">
+              <a:rPr lang="de-DE" smtClean="0"/>
+              <a:t>02.05.2017</a:t>
             </a:fld>
-            <a:endParaRPr kumimoji="0" lang="de-CH" sz="1200" b="0" i="0" u="none" strike="noStrike" kern="1200" cap="none" spc="0" normalizeH="0" baseline="0" noProof="0">
-              <a:ln>
-                <a:noFill/>
-              </a:ln>
-              <a:solidFill>
-                <a:prstClr val="black">
-                  <a:tint val="75000"/>
-                </a:prstClr>
-              </a:solidFill>
-              <a:effectLst/>
-              <a:uLnTx/>
-              <a:uFillTx/>
-              <a:latin typeface="Calibri" panose="020F0502020204030204"/>
-              <a:ea typeface="+mn-ea"/>
-              <a:cs typeface="+mn-cs"/>
-            </a:endParaRPr>
-          </a:p>
-        </p:txBody>
-      </p:sp>
-      <p:sp>
-        <p:nvSpPr>
-          <p:cNvPr id="4" name="Fußzeilenplatzhalter 3"/>
-          <p:cNvSpPr>
-            <a:spLocks noGrp="1"/>
-          </p:cNvSpPr>
-          <p:nvPr>
-            <p:ph type="ftr" sz="quarter" idx="11"/>
-          </p:nvPr>
-        </p:nvSpPr>
-        <p:spPr/>
-        <p:txBody>
-          <a:bodyPr/>
-          <a:lstStyle/>
-          <a:p>
-            <a:pPr marL="0" marR="0" lvl="0" indent="0" algn="ctr" defTabSz="914400" rtl="0" eaLnBrk="1" fontAlgn="auto" latinLnBrk="0" hangingPunct="1">
-              <a:lnSpc>
-                <a:spcPct val="100000"/>
-              </a:lnSpc>
-              <a:spcBef>
-                <a:spcPts val="0"/>
-              </a:spcBef>
-              <a:spcAft>
-                <a:spcPts val="0"/>
-              </a:spcAft>
-              <a:buClrTx/>
-              <a:buSzTx/>
-              <a:buFontTx/>
-              <a:buNone/>
-              <a:tabLst/>
-              <a:defRPr/>
-            </a:pPr>
-            <a:r>
-              <a:rPr kumimoji="0" lang="de-CH" sz="1200" b="0" i="0" u="none" strike="noStrike" kern="1200" cap="none" spc="0" normalizeH="0" baseline="0" noProof="0" smtClean="0">
-                <a:ln>
-                  <a:noFill/>
-                </a:ln>
-                <a:solidFill>
-                  <a:prstClr val="black">
-                    <a:tint val="75000"/>
-                  </a:prstClr>
-                </a:solidFill>
-                <a:effectLst/>
-                <a:uLnTx/>
-                <a:uFillTx/>
-                <a:latin typeface="Calibri" panose="020F0502020204030204"/>
-                <a:ea typeface="+mn-ea"/>
-                <a:cs typeface="+mn-cs"/>
-              </a:rPr>
-              <a:t>Team Injodikaran Projekt Hashi </a:t>
-            </a:r>
-            <a:endParaRPr kumimoji="0" lang="de-CH" sz="1200" b="0" i="0" u="none" strike="noStrike" kern="1200" cap="none" spc="0" normalizeH="0" baseline="0" noProof="0">
-              <a:ln>
-                <a:noFill/>
-              </a:ln>
-              <a:solidFill>
-                <a:prstClr val="black">
-                  <a:tint val="75000"/>
-                </a:prstClr>
-              </a:solidFill>
-              <a:effectLst/>
-              <a:uLnTx/>
-              <a:uFillTx/>
-              <a:latin typeface="Calibri" panose="020F0502020204030204"/>
-              <a:ea typeface="+mn-ea"/>
-              <a:cs typeface="+mn-cs"/>
-            </a:endParaRPr>
-          </a:p>
-        </p:txBody>
-      </p:sp>
-      <p:sp>
-        <p:nvSpPr>
-          <p:cNvPr id="5" name="Foliennummernplatzhalter 4"/>
+            <a:endParaRPr lang="de-CH"/>
+          </a:p>
+        </p:txBody>
+      </p:sp>
+      <p:sp>
+        <p:nvSpPr>
+          <p:cNvPr id="9" name="Foliennummernplatzhalter 8"/>
           <p:cNvSpPr>
             <a:spLocks noGrp="1"/>
           </p:cNvSpPr>
@@ -4705,75 +4633,11 @@
           <a:bodyPr/>
           <a:lstStyle/>
           <a:p>
-            <a:pPr marL="0" marR="0" lvl="0" indent="0" algn="r" defTabSz="914400" rtl="0" eaLnBrk="1" fontAlgn="auto" latinLnBrk="0" hangingPunct="1">
-              <a:lnSpc>
-                <a:spcPct val="100000"/>
-              </a:lnSpc>
-              <a:spcBef>
-                <a:spcPts val="0"/>
-              </a:spcBef>
-              <a:spcAft>
-                <a:spcPts val="0"/>
-              </a:spcAft>
-              <a:buClrTx/>
-              <a:buSzTx/>
-              <a:buFontTx/>
-              <a:buNone/>
-              <a:tabLst/>
-              <a:defRPr/>
-            </a:pPr>
             <a:fld id="{2B4A2A88-09B5-4B83-9B03-70976F071804}" type="slidenum">
-              <a:rPr kumimoji="0" lang="de-CH" sz="1200" b="0" i="0" u="none" strike="noStrike" kern="1200" cap="none" spc="0" normalizeH="0" baseline="0" noProof="0" smtClean="0">
-                <a:ln>
-                  <a:noFill/>
-                </a:ln>
-                <a:solidFill>
-                  <a:prstClr val="black">
-                    <a:tint val="75000"/>
-                  </a:prstClr>
-                </a:solidFill>
-                <a:effectLst/>
-                <a:uLnTx/>
-                <a:uFillTx/>
-                <a:latin typeface="Calibri" panose="020F0502020204030204"/>
-                <a:ea typeface="+mn-ea"/>
-                <a:cs typeface="+mn-cs"/>
-              </a:rPr>
-              <a:pPr marL="0" marR="0" lvl="0" indent="0" algn="r" defTabSz="914400" rtl="0" eaLnBrk="1" fontAlgn="auto" latinLnBrk="0" hangingPunct="1">
-                <a:lnSpc>
-                  <a:spcPct val="100000"/>
-                </a:lnSpc>
-                <a:spcBef>
-                  <a:spcPts val="0"/>
-                </a:spcBef>
-                <a:spcAft>
-                  <a:spcPts val="0"/>
-                </a:spcAft>
-                <a:buClrTx/>
-                <a:buSzTx/>
-                <a:buFontTx/>
-                <a:buNone/>
-                <a:tabLst/>
-                <a:defRPr/>
-              </a:pPr>
+              <a:rPr lang="de-CH" smtClean="0"/>
               <a:t>2</a:t>
             </a:fld>
-            <a:endParaRPr kumimoji="0" lang="de-CH" sz="1200" b="0" i="0" u="none" strike="noStrike" kern="1200" cap="none" spc="0" normalizeH="0" baseline="0" noProof="0">
-              <a:ln>
-                <a:noFill/>
-              </a:ln>
-              <a:solidFill>
-                <a:prstClr val="black">
-                  <a:tint val="75000"/>
-                </a:prstClr>
-              </a:solidFill>
-              <a:effectLst/>
-              <a:uLnTx/>
-              <a:uFillTx/>
-              <a:latin typeface="Calibri" panose="020F0502020204030204"/>
-              <a:ea typeface="+mn-ea"/>
-              <a:cs typeface="+mn-cs"/>
-            </a:endParaRPr>
+            <a:endParaRPr lang="de-CH"/>
           </a:p>
         </p:txBody>
       </p:sp>
@@ -4831,11 +4695,7 @@
           <a:p>
             <a:r>
               <a:rPr lang="de-CH" dirty="0" smtClean="0"/>
-              <a:t>Arbeitsk</a:t>
-            </a:r>
-            <a:r>
-              <a:rPr lang="de-CH" dirty="0" smtClean="0"/>
-              <a:t>onzept </a:t>
+              <a:t>Arbeitskonzept </a:t>
             </a:r>
             <a:r>
               <a:rPr lang="de-CH" dirty="0"/>
@@ -4872,7 +4732,7 @@
       </p:sp>
       <p:sp>
         <p:nvSpPr>
-          <p:cNvPr id="3" name="Datumsplatzhalter 2"/>
+          <p:cNvPr id="6" name="Datumsplatzhalter 5"/>
           <p:cNvSpPr>
             <a:spLocks noGrp="1"/>
           </p:cNvSpPr>
@@ -4885,9 +4745,9 @@
           <a:bodyPr/>
           <a:lstStyle/>
           <a:p>
-            <a:fld id="{1E4065D5-A880-4EC3-A5E7-47E2E7122B94}" type="datetime1">
-              <a:rPr lang="de-CH" smtClean="0"/>
-              <a:t>13.04.2017</a:t>
+            <a:fld id="{0C2D4E7A-E99D-4300-AF28-E26ACCCD1B91}" type="datetime1">
+              <a:rPr lang="de-DE" smtClean="0"/>
+              <a:t>02.05.2017</a:t>
             </a:fld>
             <a:endParaRPr lang="de-CH"/>
           </a:p>
@@ -4895,30 +4755,7 @@
       </p:sp>
       <p:sp>
         <p:nvSpPr>
-          <p:cNvPr id="4" name="Fußzeilenplatzhalter 3"/>
-          <p:cNvSpPr>
-            <a:spLocks noGrp="1"/>
-          </p:cNvSpPr>
-          <p:nvPr>
-            <p:ph type="ftr" sz="quarter" idx="11"/>
-          </p:nvPr>
-        </p:nvSpPr>
-        <p:spPr/>
-        <p:txBody>
-          <a:bodyPr/>
-          <a:lstStyle/>
-          <a:p>
-            <a:r>
-              <a:rPr lang="de-CH" smtClean="0"/>
-              <a:t>Team Injodikaran Projekt Hashi </a:t>
-            </a:r>
-            <a:endParaRPr lang="de-CH"/>
-          </a:p>
-        </p:txBody>
-      </p:sp>
-      <p:sp>
-        <p:nvSpPr>
-          <p:cNvPr id="5" name="Foliennummernplatzhalter 4"/>
+          <p:cNvPr id="9" name="Foliennummernplatzhalter 8"/>
           <p:cNvSpPr>
             <a:spLocks noGrp="1"/>
           </p:cNvSpPr>
@@ -4999,75 +4836,6 @@
           </a:p>
         </p:txBody>
       </p:sp>
-      <p:sp>
-        <p:nvSpPr>
-          <p:cNvPr id="4" name="Datumsplatzhalter 3"/>
-          <p:cNvSpPr>
-            <a:spLocks noGrp="1"/>
-          </p:cNvSpPr>
-          <p:nvPr>
-            <p:ph type="dt" sz="half" idx="10"/>
-          </p:nvPr>
-        </p:nvSpPr>
-        <p:spPr/>
-        <p:txBody>
-          <a:bodyPr/>
-          <a:lstStyle/>
-          <a:p>
-            <a:fld id="{6D09B216-EA7F-4D08-8700-60CA2D180B2B}" type="datetime1">
-              <a:rPr lang="de-CH" smtClean="0"/>
-              <a:t>13.04.2017</a:t>
-            </a:fld>
-            <a:endParaRPr lang="de-CH"/>
-          </a:p>
-        </p:txBody>
-      </p:sp>
-      <p:sp>
-        <p:nvSpPr>
-          <p:cNvPr id="5" name="Fußzeilenplatzhalter 4"/>
-          <p:cNvSpPr>
-            <a:spLocks noGrp="1"/>
-          </p:cNvSpPr>
-          <p:nvPr>
-            <p:ph type="ftr" sz="quarter" idx="11"/>
-          </p:nvPr>
-        </p:nvSpPr>
-        <p:spPr/>
-        <p:txBody>
-          <a:bodyPr/>
-          <a:lstStyle/>
-          <a:p>
-            <a:r>
-              <a:rPr lang="de-CH" smtClean="0"/>
-              <a:t>Team Injodikaran Projekt Hashi </a:t>
-            </a:r>
-            <a:endParaRPr lang="de-CH"/>
-          </a:p>
-        </p:txBody>
-      </p:sp>
-      <p:sp>
-        <p:nvSpPr>
-          <p:cNvPr id="6" name="Foliennummernplatzhalter 5"/>
-          <p:cNvSpPr>
-            <a:spLocks noGrp="1"/>
-          </p:cNvSpPr>
-          <p:nvPr>
-            <p:ph type="sldNum" sz="quarter" idx="12"/>
-          </p:nvPr>
-        </p:nvSpPr>
-        <p:spPr/>
-        <p:txBody>
-          <a:bodyPr/>
-          <a:lstStyle/>
-          <a:p>
-            <a:fld id="{2B4A2A88-09B5-4B83-9B03-70976F071804}" type="slidenum">
-              <a:rPr lang="de-CH" smtClean="0"/>
-              <a:t>4</a:t>
-            </a:fld>
-            <a:endParaRPr lang="de-CH"/>
-          </a:p>
-        </p:txBody>
-      </p:sp>
       <p:pic>
         <p:nvPicPr>
           <p:cNvPr id="10" name="Grafik 9"/>
@@ -5084,14 +4852,60 @@
         </p:blipFill>
         <p:spPr>
           <a:xfrm>
-            <a:off x="4038600" y="365125"/>
-            <a:ext cx="6924675" cy="5962650"/>
+            <a:off x="3200401" y="1025232"/>
+            <a:ext cx="6191250" cy="5331118"/>
           </a:xfrm>
           <a:prstGeom prst="rect">
             <a:avLst/>
           </a:prstGeom>
         </p:spPr>
       </p:pic>
+      <p:sp>
+        <p:nvSpPr>
+          <p:cNvPr id="3" name="Datumsplatzhalter 2"/>
+          <p:cNvSpPr>
+            <a:spLocks noGrp="1"/>
+          </p:cNvSpPr>
+          <p:nvPr>
+            <p:ph type="dt" sz="half" idx="10"/>
+          </p:nvPr>
+        </p:nvSpPr>
+        <p:spPr/>
+        <p:txBody>
+          <a:bodyPr/>
+          <a:lstStyle/>
+          <a:p>
+            <a:fld id="{1FEA4B17-3E61-46D7-B55B-F7ECDEA59193}" type="datetime1">
+              <a:rPr lang="de-DE" smtClean="0"/>
+              <a:t>02.05.2017</a:t>
+            </a:fld>
+            <a:endParaRPr lang="de-CH"/>
+          </a:p>
+        </p:txBody>
+      </p:sp>
+      <p:sp>
+        <p:nvSpPr>
+          <p:cNvPr id="8" name="Foliennummernplatzhalter 7"/>
+          <p:cNvSpPr>
+            <a:spLocks noGrp="1"/>
+          </p:cNvSpPr>
+          <p:nvPr>
+            <p:ph type="sldNum" sz="quarter" idx="12"/>
+          </p:nvPr>
+        </p:nvSpPr>
+        <p:spPr/>
+        <p:txBody>
+          <a:bodyPr/>
+          <a:lstStyle/>
+          <a:p>
+            <a:fld id="{2B4A2A88-09B5-4B83-9B03-70976F071804}" type="slidenum">
+              <a:rPr lang="de-CH" smtClean="0"/>
+              <a:t>4</a:t>
+            </a:fld>
+            <a:endParaRPr lang="de-CH"/>
+          </a:p>
+        </p:txBody>
+      </p:sp>
     </p:spTree>
     <p:extLst>
       <p:ext uri="{BB962C8B-B14F-4D97-AF65-F5344CB8AC3E}">
@@ -5102,6 +4916,13 @@
   <p:clrMapOvr>
     <a:masterClrMapping/>
   </p:clrMapOvr>
+  <p:timing>
+    <p:tnLst>
+      <p:par>
+        <p:cTn id="1" dur="indefinite" restart="never" nodeType="tmRoot"/>
+      </p:par>
+    </p:tnLst>
+  </p:timing>
 </p:sld>
 </file>
 
@@ -5193,75 +5014,6 @@
               <a:t> das Muster speziell ergänzt wird, (Controller)  um die Beziehungen zu realisieren</a:t>
             </a:r>
             <a:endParaRPr lang="de-CH" dirty="0"/>
-          </a:p>
-        </p:txBody>
-      </p:sp>
-      <p:sp>
-        <p:nvSpPr>
-          <p:cNvPr id="3" name="Datumsplatzhalter 2"/>
-          <p:cNvSpPr>
-            <a:spLocks noGrp="1"/>
-          </p:cNvSpPr>
-          <p:nvPr>
-            <p:ph type="dt" sz="half" idx="10"/>
-          </p:nvPr>
-        </p:nvSpPr>
-        <p:spPr/>
-        <p:txBody>
-          <a:bodyPr/>
-          <a:lstStyle/>
-          <a:p>
-            <a:fld id="{6805899F-8CC0-4D1A-926D-29F036158FA4}" type="datetime1">
-              <a:rPr lang="de-CH" smtClean="0"/>
-              <a:t>13.04.2017</a:t>
-            </a:fld>
-            <a:endParaRPr lang="de-CH"/>
-          </a:p>
-        </p:txBody>
-      </p:sp>
-      <p:sp>
-        <p:nvSpPr>
-          <p:cNvPr id="4" name="Fußzeilenplatzhalter 3"/>
-          <p:cNvSpPr>
-            <a:spLocks noGrp="1"/>
-          </p:cNvSpPr>
-          <p:nvPr>
-            <p:ph type="ftr" sz="quarter" idx="11"/>
-          </p:nvPr>
-        </p:nvSpPr>
-        <p:spPr/>
-        <p:txBody>
-          <a:bodyPr/>
-          <a:lstStyle/>
-          <a:p>
-            <a:r>
-              <a:rPr lang="de-CH" smtClean="0"/>
-              <a:t>Team Injodikaran Projekt Hashi </a:t>
-            </a:r>
-            <a:endParaRPr lang="de-CH"/>
-          </a:p>
-        </p:txBody>
-      </p:sp>
-      <p:sp>
-        <p:nvSpPr>
-          <p:cNvPr id="5" name="Foliennummernplatzhalter 4"/>
-          <p:cNvSpPr>
-            <a:spLocks noGrp="1"/>
-          </p:cNvSpPr>
-          <p:nvPr>
-            <p:ph type="sldNum" sz="quarter" idx="12"/>
-          </p:nvPr>
-        </p:nvSpPr>
-        <p:spPr/>
-        <p:txBody>
-          <a:bodyPr/>
-          <a:lstStyle/>
-          <a:p>
-            <a:fld id="{2B4A2A88-09B5-4B83-9B03-70976F071804}" type="slidenum">
-              <a:rPr lang="de-CH" smtClean="0"/>
-              <a:t>5</a:t>
-            </a:fld>
-            <a:endParaRPr lang="de-CH"/>
           </a:p>
         </p:txBody>
       </p:sp>
@@ -5295,6 +5047,52 @@
           </a:prstGeom>
         </p:spPr>
       </p:pic>
+      <p:sp>
+        <p:nvSpPr>
+          <p:cNvPr id="8" name="Datumsplatzhalter 7"/>
+          <p:cNvSpPr>
+            <a:spLocks noGrp="1"/>
+          </p:cNvSpPr>
+          <p:nvPr>
+            <p:ph type="dt" sz="half" idx="10"/>
+          </p:nvPr>
+        </p:nvSpPr>
+        <p:spPr/>
+        <p:txBody>
+          <a:bodyPr/>
+          <a:lstStyle/>
+          <a:p>
+            <a:fld id="{AF07A5F2-77DB-43ED-BFF5-A5AC6428B3EB}" type="datetime1">
+              <a:rPr lang="de-DE" smtClean="0"/>
+              <a:t>02.05.2017</a:t>
+            </a:fld>
+            <a:endParaRPr lang="de-CH"/>
+          </a:p>
+        </p:txBody>
+      </p:sp>
+      <p:sp>
+        <p:nvSpPr>
+          <p:cNvPr id="10" name="Foliennummernplatzhalter 9"/>
+          <p:cNvSpPr>
+            <a:spLocks noGrp="1"/>
+          </p:cNvSpPr>
+          <p:nvPr>
+            <p:ph type="sldNum" sz="quarter" idx="12"/>
+          </p:nvPr>
+        </p:nvSpPr>
+        <p:spPr/>
+        <p:txBody>
+          <a:bodyPr/>
+          <a:lstStyle/>
+          <a:p>
+            <a:fld id="{2B4A2A88-09B5-4B83-9B03-70976F071804}" type="slidenum">
+              <a:rPr lang="de-CH" smtClean="0"/>
+              <a:t>5</a:t>
+            </a:fld>
+            <a:endParaRPr lang="de-CH"/>
+          </a:p>
+        </p:txBody>
+      </p:sp>
     </p:spTree>
     <p:extLst>
       <p:ext uri="{BB962C8B-B14F-4D97-AF65-F5344CB8AC3E}">
@@ -5386,7 +5184,7 @@
       </p:sp>
       <p:sp>
         <p:nvSpPr>
-          <p:cNvPr id="3" name="Datumsplatzhalter 2"/>
+          <p:cNvPr id="7" name="Datumsplatzhalter 6"/>
           <p:cNvSpPr>
             <a:spLocks noGrp="1"/>
           </p:cNvSpPr>
@@ -5399,9 +5197,9 @@
           <a:bodyPr/>
           <a:lstStyle/>
           <a:p>
-            <a:fld id="{85467286-1E44-4AE1-8A7C-A9E5499AD74A}" type="datetime1">
-              <a:rPr lang="de-CH" smtClean="0"/>
-              <a:t>13.04.2017</a:t>
+            <a:fld id="{35CCF305-E89E-4152-85B5-B7FEEE6E30AD}" type="datetime1">
+              <a:rPr lang="de-DE" smtClean="0"/>
+              <a:t>02.05.2017</a:t>
             </a:fld>
             <a:endParaRPr lang="de-CH"/>
           </a:p>
@@ -5409,30 +5207,7 @@
       </p:sp>
       <p:sp>
         <p:nvSpPr>
-          <p:cNvPr id="4" name="Fußzeilenplatzhalter 3"/>
-          <p:cNvSpPr>
-            <a:spLocks noGrp="1"/>
-          </p:cNvSpPr>
-          <p:nvPr>
-            <p:ph type="ftr" sz="quarter" idx="11"/>
-          </p:nvPr>
-        </p:nvSpPr>
-        <p:spPr/>
-        <p:txBody>
-          <a:bodyPr/>
-          <a:lstStyle/>
-          <a:p>
-            <a:r>
-              <a:rPr lang="de-CH" smtClean="0"/>
-              <a:t>Team Injodikaran Projekt Hashi </a:t>
-            </a:r>
-            <a:endParaRPr lang="de-CH"/>
-          </a:p>
-        </p:txBody>
-      </p:sp>
-      <p:sp>
-        <p:nvSpPr>
-          <p:cNvPr id="5" name="Foliennummernplatzhalter 4"/>
+          <p:cNvPr id="9" name="Foliennummernplatzhalter 8"/>
           <p:cNvSpPr>
             <a:spLocks noGrp="1"/>
           </p:cNvSpPr>
@@ -5611,7 +5386,7 @@
       </p:sp>
       <p:sp>
         <p:nvSpPr>
-          <p:cNvPr id="3" name="Datumsplatzhalter 2"/>
+          <p:cNvPr id="7" name="Datumsplatzhalter 6"/>
           <p:cNvSpPr>
             <a:spLocks noGrp="1"/>
           </p:cNvSpPr>
@@ -5624,9 +5399,9 @@
           <a:bodyPr/>
           <a:lstStyle/>
           <a:p>
-            <a:fld id="{2426EF52-3D7E-415F-83FD-C0BDC38EC242}" type="datetime1">
-              <a:rPr lang="de-CH" smtClean="0"/>
-              <a:t>13.04.2017</a:t>
+            <a:fld id="{FCA7D953-3B3F-4638-A1FA-BD710D10F6BD}" type="datetime1">
+              <a:rPr lang="de-DE" smtClean="0"/>
+              <a:t>02.05.2017</a:t>
             </a:fld>
             <a:endParaRPr lang="de-CH"/>
           </a:p>
@@ -5634,30 +5409,7 @@
       </p:sp>
       <p:sp>
         <p:nvSpPr>
-          <p:cNvPr id="4" name="Fußzeilenplatzhalter 3"/>
-          <p:cNvSpPr>
-            <a:spLocks noGrp="1"/>
-          </p:cNvSpPr>
-          <p:nvPr>
-            <p:ph type="ftr" sz="quarter" idx="11"/>
-          </p:nvPr>
-        </p:nvSpPr>
-        <p:spPr/>
-        <p:txBody>
-          <a:bodyPr/>
-          <a:lstStyle/>
-          <a:p>
-            <a:r>
-              <a:rPr lang="de-CH" smtClean="0"/>
-              <a:t>Team Injodikaran Projekt Hashi </a:t>
-            </a:r>
-            <a:endParaRPr lang="de-CH"/>
-          </a:p>
-        </p:txBody>
-      </p:sp>
-      <p:sp>
-        <p:nvSpPr>
-          <p:cNvPr id="5" name="Foliennummernplatzhalter 4"/>
+          <p:cNvPr id="9" name="Foliennummernplatzhalter 8"/>
           <p:cNvSpPr>
             <a:spLocks noGrp="1"/>
           </p:cNvSpPr>
@@ -5785,75 +5537,6 @@
               <a:buNone/>
             </a:pPr>
             <a:endParaRPr lang="de-CH" dirty="0"/>
-          </a:p>
-        </p:txBody>
-      </p:sp>
-      <p:sp>
-        <p:nvSpPr>
-          <p:cNvPr id="4" name="Datumsplatzhalter 3"/>
-          <p:cNvSpPr>
-            <a:spLocks noGrp="1"/>
-          </p:cNvSpPr>
-          <p:nvPr>
-            <p:ph type="dt" sz="half" idx="10"/>
-          </p:nvPr>
-        </p:nvSpPr>
-        <p:spPr/>
-        <p:txBody>
-          <a:bodyPr/>
-          <a:lstStyle/>
-          <a:p>
-            <a:fld id="{6D09B216-EA7F-4D08-8700-60CA2D180B2B}" type="datetime1">
-              <a:rPr lang="de-CH" smtClean="0"/>
-              <a:t>13.04.2017</a:t>
-            </a:fld>
-            <a:endParaRPr lang="de-CH"/>
-          </a:p>
-        </p:txBody>
-      </p:sp>
-      <p:sp>
-        <p:nvSpPr>
-          <p:cNvPr id="5" name="Fußzeilenplatzhalter 4"/>
-          <p:cNvSpPr>
-            <a:spLocks noGrp="1"/>
-          </p:cNvSpPr>
-          <p:nvPr>
-            <p:ph type="ftr" sz="quarter" idx="11"/>
-          </p:nvPr>
-        </p:nvSpPr>
-        <p:spPr/>
-        <p:txBody>
-          <a:bodyPr/>
-          <a:lstStyle/>
-          <a:p>
-            <a:r>
-              <a:rPr lang="de-CH" smtClean="0"/>
-              <a:t>Team Injodikaran Projekt Hashi </a:t>
-            </a:r>
-            <a:endParaRPr lang="de-CH"/>
-          </a:p>
-        </p:txBody>
-      </p:sp>
-      <p:sp>
-        <p:nvSpPr>
-          <p:cNvPr id="6" name="Foliennummernplatzhalter 5"/>
-          <p:cNvSpPr>
-            <a:spLocks noGrp="1"/>
-          </p:cNvSpPr>
-          <p:nvPr>
-            <p:ph type="sldNum" sz="quarter" idx="12"/>
-          </p:nvPr>
-        </p:nvSpPr>
-        <p:spPr/>
-        <p:txBody>
-          <a:bodyPr/>
-          <a:lstStyle/>
-          <a:p>
-            <a:fld id="{2B4A2A88-09B5-4B83-9B03-70976F071804}" type="slidenum">
-              <a:rPr lang="de-CH" smtClean="0"/>
-              <a:t>8</a:t>
-            </a:fld>
-            <a:endParaRPr lang="de-CH"/>
           </a:p>
         </p:txBody>
       </p:sp>
@@ -5968,6 +5651,52 @@
           </a:p>
         </p:txBody>
       </p:sp>
+      <p:sp>
+        <p:nvSpPr>
+          <p:cNvPr id="7" name="Datumsplatzhalter 6"/>
+          <p:cNvSpPr>
+            <a:spLocks noGrp="1"/>
+          </p:cNvSpPr>
+          <p:nvPr>
+            <p:ph type="dt" sz="half" idx="10"/>
+          </p:nvPr>
+        </p:nvSpPr>
+        <p:spPr/>
+        <p:txBody>
+          <a:bodyPr/>
+          <a:lstStyle/>
+          <a:p>
+            <a:fld id="{63914A92-408D-4B94-A8FD-37301E4992ED}" type="datetime1">
+              <a:rPr lang="de-DE" smtClean="0"/>
+              <a:t>02.05.2017</a:t>
+            </a:fld>
+            <a:endParaRPr lang="de-CH"/>
+          </a:p>
+        </p:txBody>
+      </p:sp>
+      <p:sp>
+        <p:nvSpPr>
+          <p:cNvPr id="11" name="Foliennummernplatzhalter 10"/>
+          <p:cNvSpPr>
+            <a:spLocks noGrp="1"/>
+          </p:cNvSpPr>
+          <p:nvPr>
+            <p:ph type="sldNum" sz="quarter" idx="12"/>
+          </p:nvPr>
+        </p:nvSpPr>
+        <p:spPr/>
+        <p:txBody>
+          <a:bodyPr/>
+          <a:lstStyle/>
+          <a:p>
+            <a:fld id="{2B4A2A88-09B5-4B83-9B03-70976F071804}" type="slidenum">
+              <a:rPr lang="de-CH" smtClean="0"/>
+              <a:t>8</a:t>
+            </a:fld>
+            <a:endParaRPr lang="de-CH"/>
+          </a:p>
+        </p:txBody>
+      </p:sp>
     </p:spTree>
     <p:extLst>
       <p:ext uri="{BB962C8B-B14F-4D97-AF65-F5344CB8AC3E}">
@@ -5978,6 +5707,13 @@
   <p:clrMapOvr>
     <a:masterClrMapping/>
   </p:clrMapOvr>
+  <p:timing>
+    <p:tnLst>
+      <p:par>
+        <p:cTn id="1" dur="indefinite" restart="never" nodeType="tmRoot"/>
+      </p:par>
+    </p:tnLst>
+  </p:timing>
 </p:sld>
 </file>
 
@@ -6121,7 +5857,7 @@
       </p:sp>
       <p:sp>
         <p:nvSpPr>
-          <p:cNvPr id="3" name="Datumsplatzhalter 2"/>
+          <p:cNvPr id="7" name="Datumsplatzhalter 6"/>
           <p:cNvSpPr>
             <a:spLocks noGrp="1"/>
           </p:cNvSpPr>
@@ -6134,48 +5870,17 @@
           <a:bodyPr/>
           <a:lstStyle/>
           <a:p>
-            <a:fld id="{624CB174-D2A0-4FA3-95CD-A2AC8C3B431D}" type="datetime1">
-              <a:rPr lang="de-CH" b="1" smtClean="0"/>
-              <a:t>13.04.2017</a:t>
+            <a:fld id="{84E41B0B-81DC-459C-841E-EF5B9C2D3AE9}" type="datetime1">
+              <a:rPr lang="de-DE" smtClean="0"/>
+              <a:t>02.05.2017</a:t>
             </a:fld>
-            <a:endParaRPr lang="de-CH" b="1" dirty="0"/>
-          </a:p>
-        </p:txBody>
-      </p:sp>
-      <p:sp>
-        <p:nvSpPr>
-          <p:cNvPr id="4" name="Fußzeilenplatzhalter 3"/>
-          <p:cNvSpPr>
-            <a:spLocks noGrp="1"/>
-          </p:cNvSpPr>
-          <p:nvPr>
-            <p:ph type="ftr" sz="quarter" idx="11"/>
-          </p:nvPr>
-        </p:nvSpPr>
-        <p:spPr/>
-        <p:txBody>
-          <a:bodyPr/>
-          <a:lstStyle/>
-          <a:p>
-            <a:r>
-              <a:rPr lang="de-CH" b="1" dirty="0" smtClean="0"/>
-              <a:t>Team Injodikaran Projekt </a:t>
-            </a:r>
-            <a:r>
-              <a:rPr lang="de-CH" b="1" dirty="0" err="1" smtClean="0"/>
-              <a:t>Hashi</a:t>
-            </a:r>
-            <a:r>
-              <a:rPr lang="de-CH" b="1" dirty="0" smtClean="0"/>
-              <a:t> </a:t>
-            </a:r>
-            <a:endParaRPr lang="de-CH" b="1" dirty="0"/>
-          </a:p>
-        </p:txBody>
-      </p:sp>
-      <p:sp>
-        <p:nvSpPr>
-          <p:cNvPr id="5" name="Foliennummernplatzhalter 4"/>
+            <a:endParaRPr lang="de-CH"/>
+          </a:p>
+        </p:txBody>
+      </p:sp>
+      <p:sp>
+        <p:nvSpPr>
+          <p:cNvPr id="9" name="Foliennummernplatzhalter 8"/>
           <p:cNvSpPr>
             <a:spLocks noGrp="1"/>
           </p:cNvSpPr>
@@ -6997,4 +6702,265 @@
     </a:ext>
   </a:extLst>
 </a:theme>
+</file>
+
+<file path=ppt/theme/theme4.xml><?xml version="1.0" encoding="utf-8"?>
+<a:theme xmlns:a="http://schemas.openxmlformats.org/drawingml/2006/main" name="Office">
+  <a:themeElements>
+    <a:clrScheme name="Office">
+      <a:dk1>
+        <a:sysClr val="windowText" lastClr="000000"/>
+      </a:dk1>
+      <a:lt1>
+        <a:sysClr val="window" lastClr="FFFFFF"/>
+      </a:lt1>
+      <a:dk2>
+        <a:srgbClr val="44546A"/>
+      </a:dk2>
+      <a:lt2>
+        <a:srgbClr val="E7E6E6"/>
+      </a:lt2>
+      <a:accent1>
+        <a:srgbClr val="5B9BD5"/>
+      </a:accent1>
+      <a:accent2>
+        <a:srgbClr val="ED7D31"/>
+      </a:accent2>
+      <a:accent3>
+        <a:srgbClr val="A5A5A5"/>
+      </a:accent3>
+      <a:accent4>
+        <a:srgbClr val="FFC000"/>
+      </a:accent4>
+      <a:accent5>
+        <a:srgbClr val="4472C4"/>
+      </a:accent5>
+      <a:accent6>
+        <a:srgbClr val="70AD47"/>
+      </a:accent6>
+      <a:hlink>
+        <a:srgbClr val="0563C1"/>
+      </a:hlink>
+      <a:folHlink>
+        <a:srgbClr val="954F72"/>
+      </a:folHlink>
+    </a:clrScheme>
+    <a:fontScheme name="Office">
+      <a:majorFont>
+        <a:latin typeface="Calibri Light" panose="020F0302020204030204"/>
+        <a:ea typeface=""/>
+        <a:cs typeface=""/>
+        <a:font script="Jpan" typeface="游ゴシック Light"/>
+        <a:font script="Hang" typeface="맑은 고딕"/>
+        <a:font script="Hans" typeface="等线 Light"/>
+        <a:font script="Hant" typeface="新細明體"/>
+        <a:font script="Arab" typeface="Times New Roman"/>
+        <a:font script="Hebr" typeface="Times New Roman"/>
+        <a:font script="Thai" typeface="Angsana New"/>
+        <a:font script="Ethi" typeface="Nyala"/>
+        <a:font script="Beng" typeface="Vrinda"/>
+        <a:font script="Gujr" typeface="Shruti"/>
+        <a:font script="Khmr" typeface="MoolBoran"/>
+        <a:font script="Knda" typeface="Tunga"/>
+        <a:font script="Guru" typeface="Raavi"/>
+        <a:font script="Cans" typeface="Euphemia"/>
+        <a:font script="Cher" typeface="Plantagenet Cherokee"/>
+        <a:font script="Yiii" typeface="Microsoft Yi Baiti"/>
+        <a:font script="Tibt" typeface="Microsoft Himalaya"/>
+        <a:font script="Thaa" typeface="MV Boli"/>
+        <a:font script="Deva" typeface="Mangal"/>
+        <a:font script="Telu" typeface="Gautami"/>
+        <a:font script="Taml" typeface="Latha"/>
+        <a:font script="Syrc" typeface="Estrangelo Edessa"/>
+        <a:font script="Orya" typeface="Kalinga"/>
+        <a:font script="Mlym" typeface="Kartika"/>
+        <a:font script="Laoo" typeface="DokChampa"/>
+        <a:font script="Sinh" typeface="Iskoola Pota"/>
+        <a:font script="Mong" typeface="Mongolian Baiti"/>
+        <a:font script="Viet" typeface="Times New Roman"/>
+        <a:font script="Uigh" typeface="Microsoft Uighur"/>
+        <a:font script="Geor" typeface="Sylfaen"/>
+      </a:majorFont>
+      <a:minorFont>
+        <a:latin typeface="Calibri" panose="020F0502020204030204"/>
+        <a:ea typeface=""/>
+        <a:cs typeface=""/>
+        <a:font script="Jpan" typeface="游ゴシック"/>
+        <a:font script="Hang" typeface="맑은 고딕"/>
+        <a:font script="Hans" typeface="等线"/>
+        <a:font script="Hant" typeface="新細明體"/>
+        <a:font script="Arab" typeface="Arial"/>
+        <a:font script="Hebr" typeface="Arial"/>
+        <a:font script="Thai" typeface="Cordia New"/>
+        <a:font script="Ethi" typeface="Nyala"/>
+        <a:font script="Beng" typeface="Vrinda"/>
+        <a:font script="Gujr" typeface="Shruti"/>
+        <a:font script="Khmr" typeface="DaunPenh"/>
+        <a:font script="Knda" typeface="Tunga"/>
+        <a:font script="Guru" typeface="Raavi"/>
+        <a:font script="Cans" typeface="Euphemia"/>
+        <a:font script="Cher" typeface="Plantagenet Cherokee"/>
+        <a:font script="Yiii" typeface="Microsoft Yi Baiti"/>
+        <a:font script="Tibt" typeface="Microsoft Himalaya"/>
+        <a:font script="Thaa" typeface="MV Boli"/>
+        <a:font script="Deva" typeface="Mangal"/>
+        <a:font script="Telu" typeface="Gautami"/>
+        <a:font script="Taml" typeface="Latha"/>
+        <a:font script="Syrc" typeface="Estrangelo Edessa"/>
+        <a:font script="Orya" typeface="Kalinga"/>
+        <a:font script="Mlym" typeface="Kartika"/>
+        <a:font script="Laoo" typeface="DokChampa"/>
+        <a:font script="Sinh" typeface="Iskoola Pota"/>
+        <a:font script="Mong" typeface="Mongolian Baiti"/>
+        <a:font script="Viet" typeface="Arial"/>
+        <a:font script="Uigh" typeface="Microsoft Uighur"/>
+        <a:font script="Geor" typeface="Sylfaen"/>
+      </a:minorFont>
+    </a:fontScheme>
+    <a:fmtScheme name="Office">
+      <a:fillStyleLst>
+        <a:solidFill>
+          <a:schemeClr val="phClr"/>
+        </a:solidFill>
+        <a:gradFill rotWithShape="1">
+          <a:gsLst>
+            <a:gs pos="0">
+              <a:schemeClr val="phClr">
+                <a:lumMod val="110000"/>
+                <a:satMod val="105000"/>
+                <a:tint val="67000"/>
+              </a:schemeClr>
+            </a:gs>
+            <a:gs pos="50000">
+              <a:schemeClr val="phClr">
+                <a:lumMod val="105000"/>
+                <a:satMod val="103000"/>
+                <a:tint val="73000"/>
+              </a:schemeClr>
+            </a:gs>
+            <a:gs pos="100000">
+              <a:schemeClr val="phClr">
+                <a:lumMod val="105000"/>
+                <a:satMod val="109000"/>
+                <a:tint val="81000"/>
+              </a:schemeClr>
+            </a:gs>
+          </a:gsLst>
+          <a:lin ang="5400000" scaled="0"/>
+        </a:gradFill>
+        <a:gradFill rotWithShape="1">
+          <a:gsLst>
+            <a:gs pos="0">
+              <a:schemeClr val="phClr">
+                <a:satMod val="103000"/>
+                <a:lumMod val="102000"/>
+                <a:tint val="94000"/>
+              </a:schemeClr>
+            </a:gs>
+            <a:gs pos="50000">
+              <a:schemeClr val="phClr">
+                <a:satMod val="110000"/>
+                <a:lumMod val="100000"/>
+                <a:shade val="100000"/>
+              </a:schemeClr>
+            </a:gs>
+            <a:gs pos="100000">
+              <a:schemeClr val="phClr">
+                <a:lumMod val="99000"/>
+                <a:satMod val="120000"/>
+                <a:shade val="78000"/>
+              </a:schemeClr>
+            </a:gs>
+          </a:gsLst>
+          <a:lin ang="5400000" scaled="0"/>
+        </a:gradFill>
+      </a:fillStyleLst>
+      <a:lnStyleLst>
+        <a:ln w="6350" cap="flat" cmpd="sng" algn="ctr">
+          <a:solidFill>
+            <a:schemeClr val="phClr"/>
+          </a:solidFill>
+          <a:prstDash val="solid"/>
+          <a:miter lim="800000"/>
+        </a:ln>
+        <a:ln w="12700" cap="flat" cmpd="sng" algn="ctr">
+          <a:solidFill>
+            <a:schemeClr val="phClr"/>
+          </a:solidFill>
+          <a:prstDash val="solid"/>
+          <a:miter lim="800000"/>
+        </a:ln>
+        <a:ln w="19050" cap="flat" cmpd="sng" algn="ctr">
+          <a:solidFill>
+            <a:schemeClr val="phClr"/>
+          </a:solidFill>
+          <a:prstDash val="solid"/>
+          <a:miter lim="800000"/>
+        </a:ln>
+      </a:lnStyleLst>
+      <a:effectStyleLst>
+        <a:effectStyle>
+          <a:effectLst/>
+        </a:effectStyle>
+        <a:effectStyle>
+          <a:effectLst/>
+        </a:effectStyle>
+        <a:effectStyle>
+          <a:effectLst>
+            <a:outerShdw blurRad="57150" dist="19050" dir="5400000" algn="ctr" rotWithShape="0">
+              <a:srgbClr val="000000">
+                <a:alpha val="63000"/>
+              </a:srgbClr>
+            </a:outerShdw>
+          </a:effectLst>
+        </a:effectStyle>
+      </a:effectStyleLst>
+      <a:bgFillStyleLst>
+        <a:solidFill>
+          <a:schemeClr val="phClr"/>
+        </a:solidFill>
+        <a:solidFill>
+          <a:schemeClr val="phClr">
+            <a:tint val="95000"/>
+            <a:satMod val="170000"/>
+          </a:schemeClr>
+        </a:solidFill>
+        <a:gradFill rotWithShape="1">
+          <a:gsLst>
+            <a:gs pos="0">
+              <a:schemeClr val="phClr">
+                <a:tint val="93000"/>
+                <a:satMod val="150000"/>
+                <a:shade val="98000"/>
+                <a:lumMod val="102000"/>
+              </a:schemeClr>
+            </a:gs>
+            <a:gs pos="50000">
+              <a:schemeClr val="phClr">
+                <a:tint val="98000"/>
+                <a:satMod val="130000"/>
+                <a:shade val="90000"/>
+                <a:lumMod val="103000"/>
+              </a:schemeClr>
+            </a:gs>
+            <a:gs pos="100000">
+              <a:schemeClr val="phClr">
+                <a:shade val="63000"/>
+                <a:satMod val="120000"/>
+              </a:schemeClr>
+            </a:gs>
+          </a:gsLst>
+          <a:lin ang="5400000" scaled="0"/>
+        </a:gradFill>
+      </a:bgFillStyleLst>
+    </a:fmtScheme>
+  </a:themeElements>
+  <a:objectDefaults/>
+  <a:extraClrSchemeLst/>
+  <a:extLst>
+    <a:ext uri="{05A4C25C-085E-4340-85A3-A5531E510DB2}">
+      <thm15:themeFamily xmlns:thm15="http://schemas.microsoft.com/office/thememl/2012/main" name="Office Theme" id="{62F939B6-93AF-4DB8-9C6B-D6C7DFDC589F}" vid="{4A3C46E8-61CC-4603-A589-7422A47A8E4A}"/>
+    </a:ext>
+  </a:extLst>
+</a:theme>
 </file>
</xml_diff>